<commit_message>
maybe the last update prior to presentation
</commit_message>
<xml_diff>
--- a/Vaccine_Adverse_symptoms_Capstone.pptx
+++ b/Vaccine_Adverse_symptoms_Capstone.pptx
@@ -354,7 +354,7 @@
           <a:p>
             <a:fld id="{ED291B17-9318-49DB-B28B-6E5994AE9581}" type="datetime1">
               <a:rPr lang="en-US" smtClean="0"/>
-              <a:t>12/22/2021</a:t>
+              <a:t>12/23/2021</a:t>
             </a:fld>
             <a:endParaRPr lang="en-US" dirty="0"/>
           </a:p>
@@ -557,7 +557,7 @@
           <a:p>
             <a:fld id="{2CED4963-E985-44C4-B8C4-FDD613B7C2F8}" type="datetime1">
               <a:rPr lang="en-US" smtClean="0"/>
-              <a:t>12/22/2021</a:t>
+              <a:t>12/23/2021</a:t>
             </a:fld>
             <a:endParaRPr lang="en-US" dirty="0"/>
           </a:p>
@@ -919,7 +919,7 @@
           <a:p>
             <a:fld id="{ED291B17-9318-49DB-B28B-6E5994AE9581}" type="datetime1">
               <a:rPr lang="en-US" smtClean="0"/>
-              <a:t>12/22/2021</a:t>
+              <a:t>12/23/2021</a:t>
             </a:fld>
             <a:endParaRPr lang="en-US" dirty="0"/>
           </a:p>
@@ -1117,7 +1117,7 @@
           <a:p>
             <a:fld id="{78DD82B9-B8EE-4375-B6FF-88FA6ABB15D9}" type="datetime1">
               <a:rPr lang="en-US" smtClean="0"/>
-              <a:t>12/22/2021</a:t>
+              <a:t>12/23/2021</a:t>
             </a:fld>
             <a:endParaRPr lang="en-US" dirty="0"/>
           </a:p>
@@ -1429,7 +1429,7 @@
           <a:p>
             <a:fld id="{B2497495-0637-405E-AE64-5CC7506D51F5}" type="datetime1">
               <a:rPr lang="en-US" smtClean="0"/>
-              <a:t>12/22/2021</a:t>
+              <a:t>12/23/2021</a:t>
             </a:fld>
             <a:endParaRPr lang="en-US" dirty="0"/>
           </a:p>
@@ -1682,7 +1682,7 @@
           <a:p>
             <a:fld id="{7BFFD690-9426-415D-8B65-26881E07B2D4}" type="datetime1">
               <a:rPr lang="en-US" smtClean="0"/>
-              <a:t>12/22/2021</a:t>
+              <a:t>12/23/2021</a:t>
             </a:fld>
             <a:endParaRPr lang="en-US" dirty="0"/>
           </a:p>
@@ -2104,7 +2104,7 @@
           <a:p>
             <a:fld id="{04C4989A-474C-40DE-95B9-011C28B71673}" type="datetime1">
               <a:rPr lang="en-US" smtClean="0"/>
-              <a:t>12/22/2021</a:t>
+              <a:t>12/23/2021</a:t>
             </a:fld>
             <a:endParaRPr lang="en-US" dirty="0"/>
           </a:p>
@@ -2227,7 +2227,7 @@
           <a:p>
             <a:fld id="{5DB4ED54-5B5E-4A04-93D3-5772E3CE3818}" type="datetime1">
               <a:rPr lang="en-US" smtClean="0"/>
-              <a:t>12/22/2021</a:t>
+              <a:t>12/23/2021</a:t>
             </a:fld>
             <a:endParaRPr lang="en-US" dirty="0"/>
           </a:p>
@@ -2322,7 +2322,7 @@
           <a:p>
             <a:fld id="{4EDE50D6-574B-40AF-946F-D52A04ADE379}" type="datetime1">
               <a:rPr lang="en-US" smtClean="0"/>
-              <a:t>12/22/2021</a:t>
+              <a:t>12/23/2021</a:t>
             </a:fld>
             <a:endParaRPr lang="en-US" dirty="0"/>
           </a:p>
@@ -2699,7 +2699,7 @@
           <a:p>
             <a:fld id="{D82884F1-FFEA-405F-9602-3DCA865EDA4E}" type="datetime1">
               <a:rPr lang="en-US" smtClean="0"/>
-              <a:t>12/22/2021</a:t>
+              <a:t>12/23/2021</a:t>
             </a:fld>
             <a:endParaRPr lang="en-US" dirty="0"/>
           </a:p>
@@ -2992,7 +2992,7 @@
           <a:p>
             <a:fld id="{7E18DB4A-8810-4A10-AD5C-D5E2C667F5B3}" type="datetime1">
               <a:rPr lang="en-US" smtClean="0"/>
-              <a:t>12/22/2021</a:t>
+              <a:t>12/23/2021</a:t>
             </a:fld>
             <a:endParaRPr lang="en-US" dirty="0"/>
           </a:p>
@@ -3207,7 +3207,7 @@
           <a:p>
             <a:fld id="{ED291B17-9318-49DB-B28B-6E5994AE9581}" type="datetime1">
               <a:rPr lang="en-US" smtClean="0"/>
-              <a:t>12/22/2021</a:t>
+              <a:t>12/23/2021</a:t>
             </a:fld>
             <a:endParaRPr lang="en-US" dirty="0"/>
           </a:p>
@@ -4226,10 +4226,9 @@
           <a:lstStyle/>
           <a:p>
             <a:r>
-              <a:rPr lang="en-US" dirty="0" err="1"/>
-              <a:t>OUtline</a:t>
-            </a:r>
-            <a:endParaRPr lang="en-US" dirty="0"/>
+              <a:rPr lang="en-US" dirty="0"/>
+              <a:t>Outline</a:t>
+            </a:r>
           </a:p>
         </p:txBody>
       </p:sp>
@@ -4619,7 +4618,35 @@
           <a:p>
             <a:r>
               <a:rPr lang="en-US" dirty="0"/>
-              <a:t>Top ten symptoms were common and can be easily treated</a:t>
+              <a:t>Top ten symptoms</a:t>
+            </a:r>
+          </a:p>
+          <a:p>
+            <a:pPr lvl="1"/>
+            <a:r>
+              <a:rPr lang="en-US" dirty="0"/>
+              <a:t>More common in females than males</a:t>
+            </a:r>
+          </a:p>
+          <a:p>
+            <a:pPr lvl="1"/>
+            <a:r>
+              <a:rPr lang="en-US" dirty="0"/>
+              <a:t>Most commonly reported from the Moderna shot</a:t>
+            </a:r>
+          </a:p>
+          <a:p>
+            <a:pPr lvl="1"/>
+            <a:r>
+              <a:rPr lang="en-US" dirty="0"/>
+              <a:t>Most common between ages 35 and older</a:t>
+            </a:r>
+          </a:p>
+          <a:p>
+            <a:pPr lvl="1"/>
+            <a:r>
+              <a:rPr lang="en-US" dirty="0"/>
+              <a:t>Most of these symptoms are easily treatable</a:t>
             </a:r>
           </a:p>
         </p:txBody>
@@ -4907,6 +4934,24 @@
 </file>
 
 <file path=customXml/item1.xml><?xml version="1.0" encoding="utf-8"?>
+<p:properties xmlns:p="http://schemas.microsoft.com/office/2006/metadata/properties" xmlns:xsi="http://www.w3.org/2001/XMLSchema-instance" xmlns:pc="http://schemas.microsoft.com/office/infopath/2007/PartnerControls">
+  <documentManagement>
+    <Status xmlns="71af3243-3dd4-4a8d-8c0d-dd76da1f02a5">Not started</Status>
+    <MediaServiceKeyPoints xmlns="71af3243-3dd4-4a8d-8c0d-dd76da1f02a5" xsi:nil="true"/>
+  </documentManagement>
+</p:properties>
+</file>
+
+<file path=customXml/item2.xml><?xml version="1.0" encoding="utf-8"?>
+<?mso-contentType ?>
+<FormTemplates xmlns="http://schemas.microsoft.com/sharepoint/v3/contenttype/forms">
+  <Display>DocumentLibraryForm</Display>
+  <Edit>DocumentLibraryForm</Edit>
+  <New>DocumentLibraryForm</New>
+</FormTemplates>
+</file>
+
+<file path=customXml/item3.xml><?xml version="1.0" encoding="utf-8"?>
 <ct:contentTypeSchema xmlns:ct="http://schemas.microsoft.com/office/2006/metadata/contentType" xmlns:ma="http://schemas.microsoft.com/office/2006/metadata/properties/metaAttributes" ct:_="" ma:_="" ma:contentTypeName="Document" ma:contentTypeID="0x01010079F111ED35F8CC479449609E8A0923A6" ma:contentTypeVersion="12" ma:contentTypeDescription="Create a new document." ma:contentTypeScope="" ma:versionID="a410dd7f93c95333ffa1b60ed6adedd1">
   <xsd:schema xmlns:xsd="http://www.w3.org/2001/XMLSchema" xmlns:xs="http://www.w3.org/2001/XMLSchema" xmlns:p="http://schemas.microsoft.com/office/2006/metadata/properties" xmlns:ns2="71af3243-3dd4-4a8d-8c0d-dd76da1f02a5" xmlns:ns3="16c05727-aa75-4e4a-9b5f-8a80a1165891" targetNamespace="http://schemas.microsoft.com/office/2006/metadata/properties" ma:root="true" ma:fieldsID="a936d9baba76aa3866493feff160faab" ns2:_="" ns3:_="">
     <xsd:import namespace="71af3243-3dd4-4a8d-8c0d-dd76da1f02a5"/>
@@ -5127,25 +5172,25 @@
 </ct:contentTypeSchema>
 </file>
 
-<file path=customXml/item2.xml><?xml version="1.0" encoding="utf-8"?>
-<?mso-contentType ?>
-<FormTemplates xmlns="http://schemas.microsoft.com/sharepoint/v3/contenttype/forms">
-  <Display>DocumentLibraryForm</Display>
-  <Edit>DocumentLibraryForm</Edit>
-  <New>DocumentLibraryForm</New>
-</FormTemplates>
+<file path=customXml/itemProps1.xml><?xml version="1.0" encoding="utf-8"?>
+<ds:datastoreItem xmlns:ds="http://schemas.openxmlformats.org/officeDocument/2006/customXml" ds:itemID="{8D289AE2-D2AE-49D1-AFAC-3A79F6794255}">
+  <ds:schemaRefs>
+    <ds:schemaRef ds:uri="http://schemas.microsoft.com/office/2006/metadata/properties"/>
+    <ds:schemaRef ds:uri="http://schemas.microsoft.com/office/infopath/2007/PartnerControls"/>
+    <ds:schemaRef ds:uri="71af3243-3dd4-4a8d-8c0d-dd76da1f02a5"/>
+  </ds:schemaRefs>
+</ds:datastoreItem>
 </file>
 
-<file path=customXml/item3.xml><?xml version="1.0" encoding="utf-8"?>
-<p:properties xmlns:p="http://schemas.microsoft.com/office/2006/metadata/properties" xmlns:xsi="http://www.w3.org/2001/XMLSchema-instance" xmlns:pc="http://schemas.microsoft.com/office/infopath/2007/PartnerControls">
-  <documentManagement>
-    <Status xmlns="71af3243-3dd4-4a8d-8c0d-dd76da1f02a5">Not started</Status>
-    <MediaServiceKeyPoints xmlns="71af3243-3dd4-4a8d-8c0d-dd76da1f02a5" xsi:nil="true"/>
-  </documentManagement>
-</p:properties>
+<file path=customXml/itemProps2.xml><?xml version="1.0" encoding="utf-8"?>
+<ds:datastoreItem xmlns:ds="http://schemas.openxmlformats.org/officeDocument/2006/customXml" ds:itemID="{927BD4C1-B6B1-4715-ABF9-E660A51A4EA0}">
+  <ds:schemaRefs>
+    <ds:schemaRef ds:uri="http://schemas.microsoft.com/sharepoint/v3/contenttype/forms"/>
+  </ds:schemaRefs>
+</ds:datastoreItem>
 </file>
 
-<file path=customXml/itemProps1.xml><?xml version="1.0" encoding="utf-8"?>
+<file path=customXml/itemProps3.xml><?xml version="1.0" encoding="utf-8"?>
 <ds:datastoreItem xmlns:ds="http://schemas.openxmlformats.org/officeDocument/2006/customXml" ds:itemID="{41E7CA09-9778-4414-AE97-8064B12DA30E}">
   <ds:schemaRefs>
     <ds:schemaRef ds:uri="http://schemas.microsoft.com/office/2006/metadata/contentType"/>
@@ -5162,22 +5207,4 @@
     <ds:schemaRef ds:uri="http://schemas.microsoft.com/internal/obd"/>
   </ds:schemaRefs>
 </ds:datastoreItem>
-</file>
-
-<file path=customXml/itemProps2.xml><?xml version="1.0" encoding="utf-8"?>
-<ds:datastoreItem xmlns:ds="http://schemas.openxmlformats.org/officeDocument/2006/customXml" ds:itemID="{927BD4C1-B6B1-4715-ABF9-E660A51A4EA0}">
-  <ds:schemaRefs>
-    <ds:schemaRef ds:uri="http://schemas.microsoft.com/sharepoint/v3/contenttype/forms"/>
-  </ds:schemaRefs>
-</ds:datastoreItem>
-</file>
-
-<file path=customXml/itemProps3.xml><?xml version="1.0" encoding="utf-8"?>
-<ds:datastoreItem xmlns:ds="http://schemas.openxmlformats.org/officeDocument/2006/customXml" ds:itemID="{8D289AE2-D2AE-49D1-AFAC-3A79F6794255}">
-  <ds:schemaRefs>
-    <ds:schemaRef ds:uri="http://schemas.microsoft.com/office/2006/metadata/properties"/>
-    <ds:schemaRef ds:uri="http://schemas.microsoft.com/office/infopath/2007/PartnerControls"/>
-    <ds:schemaRef ds:uri="71af3243-3dd4-4a8d-8c0d-dd76da1f02a5"/>
-  </ds:schemaRefs>
-</ds:datastoreItem>
 </file>
</xml_diff>